<commit_message>
Consulta JPQL - Criteria - JPA Repository
</commit_message>
<xml_diff>
--- a/documentacao/Aula Spring.pptx
+++ b/documentacao/Aula Spring.pptx
@@ -5,10 +5,10 @@
     <p:sldMasterId id="2147483648" r:id="rId4"/>
   </p:sldMasterIdLst>
   <p:notesMasterIdLst>
-    <p:notesMasterId r:id="rId12"/>
+    <p:notesMasterId r:id="rId13"/>
   </p:notesMasterIdLst>
   <p:handoutMasterIdLst>
-    <p:handoutMasterId r:id="rId13"/>
+    <p:handoutMasterId r:id="rId14"/>
   </p:handoutMasterIdLst>
   <p:sldIdLst>
     <p:sldId id="263" r:id="rId5"/>
@@ -16,8 +16,9 @@
     <p:sldId id="259" r:id="rId7"/>
     <p:sldId id="258" r:id="rId8"/>
     <p:sldId id="260" r:id="rId9"/>
-    <p:sldId id="261" r:id="rId10"/>
-    <p:sldId id="262" r:id="rId11"/>
+    <p:sldId id="264" r:id="rId10"/>
+    <p:sldId id="261" r:id="rId11"/>
+    <p:sldId id="262" r:id="rId12"/>
   </p:sldIdLst>
   <p:sldSz cx="12192000" cy="6858000"/>
   <p:notesSz cx="6858000" cy="9144000"/>
@@ -229,7 +230,7 @@
           <a:p>
             <a:fld id="{A2D6289A-5475-4AFF-ADC1-69456EC5E025}" type="datetimeFigureOut">
               <a:rPr lang="pt-BR" smtClean="0"/>
-              <a:t>12/02/2019</a:t>
+              <a:t>14/02/2019</a:t>
             </a:fld>
             <a:endParaRPr lang="pt-BR"/>
           </a:p>
@@ -418,7 +419,7 @@
           <a:p>
             <a:fld id="{8D389CDA-C1E7-450D-8644-BDFE60C562AC}" type="datetimeFigureOut">
               <a:rPr lang="pt-BR" smtClean="0"/>
-              <a:t>12/02/2019</a:t>
+              <a:t>14/02/2019</a:t>
             </a:fld>
             <a:endParaRPr lang="pt-BR"/>
           </a:p>
@@ -4724,8 +4725,8 @@
         </p:blipFill>
         <p:spPr>
           <a:xfrm>
-            <a:off x="301121" y="1058257"/>
-            <a:ext cx="2826866" cy="1778029"/>
+            <a:off x="568854" y="942948"/>
+            <a:ext cx="2374677" cy="1493613"/>
           </a:xfrm>
           <a:prstGeom prst="rect">
             <a:avLst/>
@@ -4754,8 +4755,8 @@
         </p:blipFill>
         <p:spPr>
           <a:xfrm>
-            <a:off x="3450221" y="1498571"/>
-            <a:ext cx="2858500" cy="1193424"/>
+            <a:off x="2405437" y="1385734"/>
+            <a:ext cx="2511870" cy="828116"/>
           </a:xfrm>
           <a:prstGeom prst="rect">
             <a:avLst/>
@@ -4814,8 +4815,8 @@
         </p:blipFill>
         <p:spPr>
           <a:xfrm>
-            <a:off x="893840" y="2922543"/>
-            <a:ext cx="1807415" cy="1216227"/>
+            <a:off x="865900" y="2403453"/>
+            <a:ext cx="1807415" cy="957998"/>
           </a:xfrm>
           <a:prstGeom prst="rect">
             <a:avLst/>
@@ -4844,8 +4845,8 @@
         </p:blipFill>
         <p:spPr>
           <a:xfrm>
-            <a:off x="3644649" y="3011566"/>
-            <a:ext cx="1048706" cy="1048706"/>
+            <a:off x="3025470" y="2312745"/>
+            <a:ext cx="1008353" cy="1008353"/>
           </a:xfrm>
           <a:prstGeom prst="rect">
             <a:avLst/>
@@ -4874,8 +4875,8 @@
         </p:blipFill>
         <p:spPr>
           <a:xfrm>
-            <a:off x="5307878" y="2617307"/>
-            <a:ext cx="1815714" cy="1342297"/>
+            <a:off x="4115762" y="2194784"/>
+            <a:ext cx="1668188" cy="1233236"/>
           </a:xfrm>
           <a:prstGeom prst="rect">
             <a:avLst/>
@@ -4904,8 +4905,8 @@
         </p:blipFill>
         <p:spPr>
           <a:xfrm>
-            <a:off x="1568051" y="4458341"/>
-            <a:ext cx="7122944" cy="1820991"/>
+            <a:off x="472351" y="3430713"/>
+            <a:ext cx="5666934" cy="1552347"/>
           </a:xfrm>
           <a:prstGeom prst="rect">
             <a:avLst/>
@@ -5005,7 +5006,7 @@
                 <a:ea typeface="Tahoma" panose="020B0604030504040204" pitchFamily="34" charset="0"/>
                 <a:cs typeface="Aharoni" panose="020B0604020202020204" pitchFamily="2" charset="-79"/>
               </a:rPr>
-              <a:t>Primeiros Passos</a:t>
+              <a:t>Ferramentas</a:t>
             </a:r>
           </a:p>
         </p:txBody>
@@ -5146,6 +5147,485 @@
           </a:prstGeom>
         </p:spPr>
       </p:pic>
+      <p:grpSp>
+        <p:nvGrpSpPr>
+          <p:cNvPr id="20" name="Agrupar 19">
+            <a:extLst>
+              <a:ext uri="{FF2B5EF4-FFF2-40B4-BE49-F238E27FC236}">
+                <a16:creationId xmlns:a16="http://schemas.microsoft.com/office/drawing/2014/main" id="{C0AC6C25-B871-4075-90B3-51BB590855A3}"/>
+              </a:ext>
+            </a:extLst>
+          </p:cNvPr>
+          <p:cNvGrpSpPr/>
+          <p:nvPr/>
+        </p:nvGrpSpPr>
+        <p:grpSpPr>
+          <a:xfrm>
+            <a:off x="748454" y="1280224"/>
+            <a:ext cx="9397407" cy="3818600"/>
+            <a:chOff x="748454" y="1280224"/>
+            <a:chExt cx="9397407" cy="3818600"/>
+          </a:xfrm>
+        </p:grpSpPr>
+        <p:pic>
+          <p:nvPicPr>
+            <p:cNvPr id="5" name="Imagem 4">
+              <a:extLst>
+                <a:ext uri="{FF2B5EF4-FFF2-40B4-BE49-F238E27FC236}">
+                  <a16:creationId xmlns:a16="http://schemas.microsoft.com/office/drawing/2014/main" id="{96E85613-75FB-4EA8-9007-DDD6A77CAD23}"/>
+                </a:ext>
+              </a:extLst>
+            </p:cNvPr>
+            <p:cNvPicPr>
+              <a:picLocks noChangeAspect="1"/>
+            </p:cNvPicPr>
+            <p:nvPr/>
+          </p:nvPicPr>
+          <p:blipFill>
+            <a:blip r:embed="rId3"/>
+            <a:stretch>
+              <a:fillRect/>
+            </a:stretch>
+          </p:blipFill>
+          <p:spPr>
+            <a:xfrm>
+              <a:off x="2405437" y="1385734"/>
+              <a:ext cx="2511870" cy="828116"/>
+            </a:xfrm>
+            <a:prstGeom prst="rect">
+              <a:avLst/>
+            </a:prstGeom>
+          </p:spPr>
+        </p:pic>
+        <p:pic>
+          <p:nvPicPr>
+            <p:cNvPr id="9" name="Imagem 8">
+              <a:extLst>
+                <a:ext uri="{FF2B5EF4-FFF2-40B4-BE49-F238E27FC236}">
+                  <a16:creationId xmlns:a16="http://schemas.microsoft.com/office/drawing/2014/main" id="{1B52A6AF-5F80-4C51-ADA5-89EFE7E8A156}"/>
+                </a:ext>
+              </a:extLst>
+            </p:cNvPr>
+            <p:cNvPicPr>
+              <a:picLocks noChangeAspect="1"/>
+            </p:cNvPicPr>
+            <p:nvPr/>
+          </p:nvPicPr>
+          <p:blipFill>
+            <a:blip r:embed="rId4"/>
+            <a:stretch>
+              <a:fillRect/>
+            </a:stretch>
+          </p:blipFill>
+          <p:spPr>
+            <a:xfrm>
+              <a:off x="865900" y="2403453"/>
+              <a:ext cx="1807415" cy="957998"/>
+            </a:xfrm>
+            <a:prstGeom prst="rect">
+              <a:avLst/>
+            </a:prstGeom>
+          </p:spPr>
+        </p:pic>
+        <p:pic>
+          <p:nvPicPr>
+            <p:cNvPr id="13" name="Imagem 12">
+              <a:extLst>
+                <a:ext uri="{FF2B5EF4-FFF2-40B4-BE49-F238E27FC236}">
+                  <a16:creationId xmlns:a16="http://schemas.microsoft.com/office/drawing/2014/main" id="{B3A163B0-9253-4D01-B737-DCD4F6DE7AAC}"/>
+                </a:ext>
+              </a:extLst>
+            </p:cNvPr>
+            <p:cNvPicPr>
+              <a:picLocks noChangeAspect="1"/>
+            </p:cNvPicPr>
+            <p:nvPr/>
+          </p:nvPicPr>
+          <p:blipFill>
+            <a:blip r:embed="rId5"/>
+            <a:stretch>
+              <a:fillRect/>
+            </a:stretch>
+          </p:blipFill>
+          <p:spPr>
+            <a:xfrm>
+              <a:off x="3025470" y="2312745"/>
+              <a:ext cx="1008353" cy="1008353"/>
+            </a:xfrm>
+            <a:prstGeom prst="rect">
+              <a:avLst/>
+            </a:prstGeom>
+          </p:spPr>
+        </p:pic>
+        <p:pic>
+          <p:nvPicPr>
+            <p:cNvPr id="15" name="Imagem 14">
+              <a:extLst>
+                <a:ext uri="{FF2B5EF4-FFF2-40B4-BE49-F238E27FC236}">
+                  <a16:creationId xmlns:a16="http://schemas.microsoft.com/office/drawing/2014/main" id="{4F2F5267-5C38-4C35-BBA1-2CB4E27D36EE}"/>
+                </a:ext>
+              </a:extLst>
+            </p:cNvPr>
+            <p:cNvPicPr>
+              <a:picLocks noChangeAspect="1"/>
+            </p:cNvPicPr>
+            <p:nvPr/>
+          </p:nvPicPr>
+          <p:blipFill>
+            <a:blip r:embed="rId6"/>
+            <a:stretch>
+              <a:fillRect/>
+            </a:stretch>
+          </p:blipFill>
+          <p:spPr>
+            <a:xfrm>
+              <a:off x="4115762" y="2194784"/>
+              <a:ext cx="1668188" cy="1233236"/>
+            </a:xfrm>
+            <a:prstGeom prst="rect">
+              <a:avLst/>
+            </a:prstGeom>
+          </p:spPr>
+        </p:pic>
+        <p:pic>
+          <p:nvPicPr>
+            <p:cNvPr id="14" name="Imagem 13">
+              <a:extLst>
+                <a:ext uri="{FF2B5EF4-FFF2-40B4-BE49-F238E27FC236}">
+                  <a16:creationId xmlns:a16="http://schemas.microsoft.com/office/drawing/2014/main" id="{091A5BFC-00D6-49E4-9929-5B109D3A7468}"/>
+                </a:ext>
+              </a:extLst>
+            </p:cNvPr>
+            <p:cNvPicPr>
+              <a:picLocks noChangeAspect="1"/>
+            </p:cNvPicPr>
+            <p:nvPr/>
+          </p:nvPicPr>
+          <p:blipFill>
+            <a:blip r:embed="rId7"/>
+            <a:stretch>
+              <a:fillRect/>
+            </a:stretch>
+          </p:blipFill>
+          <p:spPr>
+            <a:xfrm>
+              <a:off x="6437333" y="1547318"/>
+              <a:ext cx="3708528" cy="2773012"/>
+            </a:xfrm>
+            <a:prstGeom prst="rect">
+              <a:avLst/>
+            </a:prstGeom>
+          </p:spPr>
+        </p:pic>
+        <p:sp>
+          <p:nvSpPr>
+            <p:cNvPr id="16" name="Caixa de texto 181">
+              <a:extLst>
+                <a:ext uri="{FF2B5EF4-FFF2-40B4-BE49-F238E27FC236}">
+                  <a16:creationId xmlns:a16="http://schemas.microsoft.com/office/drawing/2014/main" id="{878BB94C-BFF2-4090-A5DF-F55B8CD1C8F4}"/>
+                </a:ext>
+              </a:extLst>
+            </p:cNvPr>
+            <p:cNvSpPr txBox="1"/>
+            <p:nvPr/>
+          </p:nvSpPr>
+          <p:spPr>
+            <a:xfrm>
+              <a:off x="6702804" y="4250355"/>
+              <a:ext cx="3152261" cy="369332"/>
+            </a:xfrm>
+            <a:prstGeom prst="rect">
+              <a:avLst/>
+            </a:prstGeom>
+            <a:noFill/>
+          </p:spPr>
+          <p:txBody>
+            <a:bodyPr wrap="square" lIns="0" tIns="0" rIns="0" bIns="0" rtlCol="0">
+              <a:spAutoFit/>
+            </a:bodyPr>
+            <a:lstStyle/>
+            <a:p>
+              <a:pPr algn="ctr"/>
+              <a:r>
+                <a:rPr lang="pt-BR" sz="2400" dirty="0">
+                  <a:solidFill>
+                    <a:schemeClr val="tx1">
+                      <a:lumMod val="75000"/>
+                      <a:lumOff val="25000"/>
+                    </a:schemeClr>
+                  </a:solidFill>
+                  <a:latin typeface="Abadi" panose="020B0604020104020204" pitchFamily="34" charset="0"/>
+                </a:rPr>
+                <a:t>www.digytal.com.br</a:t>
+              </a:r>
+            </a:p>
+          </p:txBody>
+        </p:sp>
+        <p:pic>
+          <p:nvPicPr>
+            <p:cNvPr id="8" name="Imagem 7">
+              <a:extLst>
+                <a:ext uri="{FF2B5EF4-FFF2-40B4-BE49-F238E27FC236}">
+                  <a16:creationId xmlns:a16="http://schemas.microsoft.com/office/drawing/2014/main" id="{CBAB9280-4243-4B45-BCB8-E6CC01E32081}"/>
+                </a:ext>
+              </a:extLst>
+            </p:cNvPr>
+            <p:cNvPicPr>
+              <a:picLocks noChangeAspect="1"/>
+            </p:cNvPicPr>
+            <p:nvPr/>
+          </p:nvPicPr>
+          <p:blipFill>
+            <a:blip r:embed="rId8"/>
+            <a:stretch>
+              <a:fillRect/>
+            </a:stretch>
+          </p:blipFill>
+          <p:spPr>
+            <a:xfrm>
+              <a:off x="748454" y="3493126"/>
+              <a:ext cx="5165784" cy="1605698"/>
+            </a:xfrm>
+            <a:prstGeom prst="rect">
+              <a:avLst/>
+            </a:prstGeom>
+          </p:spPr>
+        </p:pic>
+        <p:pic>
+          <p:nvPicPr>
+            <p:cNvPr id="18" name="Imagem 17">
+              <a:extLst>
+                <a:ext uri="{FF2B5EF4-FFF2-40B4-BE49-F238E27FC236}">
+                  <a16:creationId xmlns:a16="http://schemas.microsoft.com/office/drawing/2014/main" id="{B993DA47-0785-4D99-A8B1-3AD9211CBBB6}"/>
+                </a:ext>
+              </a:extLst>
+            </p:cNvPr>
+            <p:cNvPicPr>
+              <a:picLocks noChangeAspect="1"/>
+            </p:cNvPicPr>
+            <p:nvPr/>
+          </p:nvPicPr>
+          <p:blipFill>
+            <a:blip r:embed="rId9"/>
+            <a:stretch>
+              <a:fillRect/>
+            </a:stretch>
+          </p:blipFill>
+          <p:spPr>
+            <a:xfrm>
+              <a:off x="1161954" y="1280224"/>
+              <a:ext cx="1008353" cy="1123229"/>
+            </a:xfrm>
+            <a:prstGeom prst="rect">
+              <a:avLst/>
+            </a:prstGeom>
+          </p:spPr>
+        </p:pic>
+      </p:grpSp>
+    </p:spTree>
+    <p:extLst>
+      <p:ext uri="{BB962C8B-B14F-4D97-AF65-F5344CB8AC3E}">
+        <p14:creationId xmlns:p14="http://schemas.microsoft.com/office/powerpoint/2010/main" val="1857738748"/>
+      </p:ext>
+    </p:extLst>
+  </p:cSld>
+  <p:clrMapOvr>
+    <a:masterClrMapping/>
+  </p:clrMapOvr>
+</p:sld>
+</file>
+
+<file path=ppt/slides/slide7.xml><?xml version="1.0" encoding="utf-8"?>
+<p:sld xmlns:a="http://schemas.openxmlformats.org/drawingml/2006/main" xmlns:r="http://schemas.openxmlformats.org/officeDocument/2006/relationships" xmlns:p="http://schemas.openxmlformats.org/presentationml/2006/main">
+  <p:cSld>
+    <p:spTree>
+      <p:nvGrpSpPr>
+        <p:cNvPr id="1" name=""/>
+        <p:cNvGrpSpPr/>
+        <p:nvPr/>
+      </p:nvGrpSpPr>
+      <p:grpSpPr>
+        <a:xfrm>
+          <a:off x="0" y="0"/>
+          <a:ext cx="0" cy="0"/>
+          <a:chOff x="0" y="0"/>
+          <a:chExt cx="0" cy="0"/>
+        </a:xfrm>
+      </p:grpSpPr>
+      <p:sp>
+        <p:nvSpPr>
+          <p:cNvPr id="11" name="Título de Slide">
+            <a:extLst>
+              <a:ext uri="{FF2B5EF4-FFF2-40B4-BE49-F238E27FC236}">
+                <a16:creationId xmlns:a16="http://schemas.microsoft.com/office/drawing/2014/main" id="{82336B3C-0982-49C2-85B3-D4D69E435900}"/>
+              </a:ext>
+            </a:extLst>
+          </p:cNvPr>
+          <p:cNvSpPr>
+            <a:spLocks noGrp="1"/>
+          </p:cNvSpPr>
+          <p:nvPr>
+            <p:ph type="title"/>
+          </p:nvPr>
+        </p:nvSpPr>
+        <p:spPr>
+          <a:xfrm>
+            <a:off x="637562" y="432000"/>
+            <a:ext cx="11134437" cy="540000"/>
+          </a:xfrm>
+        </p:spPr>
+        <p:txBody>
+          <a:bodyPr rtlCol="0"/>
+          <a:lstStyle/>
+          <a:p>
+            <a:pPr rtl="0"/>
+            <a:r>
+              <a:rPr lang="pt-BR" dirty="0">
+                <a:latin typeface="Abadi" panose="020B0604020202020204" pitchFamily="34" charset="0"/>
+                <a:ea typeface="Tahoma" panose="020B0604030504040204" pitchFamily="34" charset="0"/>
+                <a:cs typeface="Aharoni" panose="020B0604020202020204" pitchFamily="2" charset="-79"/>
+              </a:rPr>
+              <a:t>Primeiros Passos</a:t>
+            </a:r>
+          </a:p>
+        </p:txBody>
+      </p:sp>
+      <p:cxnSp>
+        <p:nvCxnSpPr>
+          <p:cNvPr id="130" name="Conector Reto 129" title="Linha do Conector">
+            <a:extLst>
+              <a:ext uri="{FF2B5EF4-FFF2-40B4-BE49-F238E27FC236}">
+                <a16:creationId xmlns:a16="http://schemas.microsoft.com/office/drawing/2014/main" id="{74B37803-5889-4CF1-9F0B-A07766089133}"/>
+              </a:ext>
+            </a:extLst>
+          </p:cNvPr>
+          <p:cNvCxnSpPr>
+            <a:cxnSpLocks/>
+          </p:cNvCxnSpPr>
+          <p:nvPr/>
+        </p:nvCxnSpPr>
+        <p:spPr>
+          <a:xfrm>
+            <a:off x="364950" y="6324047"/>
+            <a:ext cx="11664863" cy="66569"/>
+          </a:xfrm>
+          <a:prstGeom prst="line">
+            <a:avLst/>
+          </a:prstGeom>
+          <a:ln>
+            <a:solidFill>
+              <a:schemeClr val="bg1">
+                <a:lumMod val="75000"/>
+              </a:schemeClr>
+            </a:solidFill>
+            <a:prstDash val="dash"/>
+            <a:headEnd type="oval"/>
+            <a:tailEnd type="oval"/>
+          </a:ln>
+        </p:spPr>
+        <p:style>
+          <a:lnRef idx="1">
+            <a:schemeClr val="accent1"/>
+          </a:lnRef>
+          <a:fillRef idx="0">
+            <a:schemeClr val="accent1"/>
+          </a:fillRef>
+          <a:effectRef idx="0">
+            <a:schemeClr val="accent1"/>
+          </a:effectRef>
+          <a:fontRef idx="minor">
+            <a:schemeClr val="tx1"/>
+          </a:fontRef>
+        </p:style>
+      </p:cxnSp>
+      <p:sp>
+        <p:nvSpPr>
+          <p:cNvPr id="212" name="Colchete para Itens Agrupados" title="Colchete de Grupo">
+            <a:extLst>
+              <a:ext uri="{FF2B5EF4-FFF2-40B4-BE49-F238E27FC236}">
+                <a16:creationId xmlns:a16="http://schemas.microsoft.com/office/drawing/2014/main" id="{20E3BE3F-E81D-41AD-A12D-26D35A4AC09F}"/>
+              </a:ext>
+            </a:extLst>
+          </p:cNvPr>
+          <p:cNvSpPr/>
+          <p:nvPr/>
+        </p:nvSpPr>
+        <p:spPr>
+          <a:xfrm rot="5400000">
+            <a:off x="5867399" y="-4804261"/>
+            <a:ext cx="457201" cy="11539093"/>
+          </a:xfrm>
+          <a:prstGeom prst="rightBrace">
+            <a:avLst>
+              <a:gd name="adj1" fmla="val 44270"/>
+              <a:gd name="adj2" fmla="val 50000"/>
+            </a:avLst>
+          </a:prstGeom>
+          <a:ln>
+            <a:solidFill>
+              <a:schemeClr val="bg1">
+                <a:lumMod val="75000"/>
+              </a:schemeClr>
+            </a:solidFill>
+          </a:ln>
+        </p:spPr>
+        <p:style>
+          <a:lnRef idx="1">
+            <a:schemeClr val="accent1"/>
+          </a:lnRef>
+          <a:fillRef idx="0">
+            <a:schemeClr val="accent1"/>
+          </a:fillRef>
+          <a:effectRef idx="0">
+            <a:schemeClr val="accent1"/>
+          </a:effectRef>
+          <a:fontRef idx="minor">
+            <a:schemeClr val="tx1"/>
+          </a:fontRef>
+        </p:style>
+        <p:txBody>
+          <a:bodyPr rtlCol="0" anchor="ctr"/>
+          <a:lstStyle/>
+          <a:p>
+            <a:pPr algn="ctr" rtl="0"/>
+            <a:endParaRPr lang="pt-BR" dirty="0">
+              <a:latin typeface="Trebuchet MS" panose="020B0603020202020204" pitchFamily="34" charset="0"/>
+            </a:endParaRPr>
+          </a:p>
+        </p:txBody>
+      </p:sp>
+      <p:pic>
+        <p:nvPicPr>
+          <p:cNvPr id="12" name="Imagem 11">
+            <a:extLst>
+              <a:ext uri="{FF2B5EF4-FFF2-40B4-BE49-F238E27FC236}">
+                <a16:creationId xmlns:a16="http://schemas.microsoft.com/office/drawing/2014/main" id="{4BA976B1-3C96-465E-9B38-8829CECFF671}"/>
+              </a:ext>
+            </a:extLst>
+          </p:cNvPr>
+          <p:cNvPicPr>
+            <a:picLocks noChangeAspect="1"/>
+          </p:cNvPicPr>
+          <p:nvPr/>
+        </p:nvPicPr>
+        <p:blipFill>
+          <a:blip r:embed="rId2">
+            <a:alphaModFix amt="24000"/>
+          </a:blip>
+          <a:stretch>
+            <a:fillRect/>
+          </a:stretch>
+        </p:blipFill>
+        <p:spPr>
+          <a:xfrm>
+            <a:off x="11564395" y="6435331"/>
+            <a:ext cx="453005" cy="408770"/>
+          </a:xfrm>
+          <a:prstGeom prst="rect">
+            <a:avLst/>
+          </a:prstGeom>
+        </p:spPr>
+      </p:pic>
       <p:pic>
         <p:nvPicPr>
           <p:cNvPr id="3" name="Imagem 2">
@@ -5219,7 +5699,7 @@
 </p:sld>
 </file>
 
-<file path=ppt/slides/slide7.xml><?xml version="1.0" encoding="utf-8"?>
+<file path=ppt/slides/slide8.xml><?xml version="1.0" encoding="utf-8"?>
 <p:sld xmlns:a="http://schemas.openxmlformats.org/drawingml/2006/main" xmlns:r="http://schemas.openxmlformats.org/officeDocument/2006/relationships" xmlns:p="http://schemas.openxmlformats.org/presentationml/2006/main">
   <p:cSld>
     <p:spTree>
@@ -6633,15 +7113,6 @@
 </file>
 
 <file path=customXml/item2.xml><?xml version="1.0" encoding="utf-8"?>
-<?mso-contentType ?>
-<FormTemplates xmlns="http://schemas.microsoft.com/sharepoint/v3/contenttype/forms">
-  <Display>DocumentLibraryForm</Display>
-  <Edit>DocumentLibraryForm</Edit>
-  <New>DocumentLibraryForm</New>
-</FormTemplates>
-</file>
-
-<file path=customXml/item3.xml><?xml version="1.0" encoding="utf-8"?>
 <ct:contentTypeSchema xmlns:ct="http://schemas.microsoft.com/office/2006/metadata/contentType" xmlns:ma="http://schemas.microsoft.com/office/2006/metadata/properties/metaAttributes" ct:_="" ma:_="" ma:contentTypeName="Document" ma:contentTypeID="0x010100DEEA25CC0A0AC24199CDC46C25B8B0BC" ma:contentTypeVersion="7" ma:contentTypeDescription="Create a new document." ma:contentTypeScope="" ma:versionID="71aff31462b4074963b8c698d1c1c68f">
   <xsd:schema xmlns:xsd="http://www.w3.org/2001/XMLSchema" xmlns:xs="http://www.w3.org/2001/XMLSchema" xmlns:p="http://schemas.microsoft.com/office/2006/metadata/properties" xmlns:ns2="6dc4bcd6-49db-4c07-9060-8acfc67cef9f" xmlns:ns3="fb0879af-3eba-417a-a55a-ffe6dcd6ca77" targetNamespace="http://schemas.microsoft.com/office/2006/metadata/properties" ma:root="true" ma:fieldsID="e3831fb232ece3fdb834cba9867a0e69" ns2:_="" ns3:_="">
     <xsd:import namespace="6dc4bcd6-49db-4c07-9060-8acfc67cef9f"/>
@@ -6826,6 +7297,15 @@
 </ct:contentTypeSchema>
 </file>
 
+<file path=customXml/item3.xml><?xml version="1.0" encoding="utf-8"?>
+<?mso-contentType ?>
+<FormTemplates xmlns="http://schemas.microsoft.com/sharepoint/v3/contenttype/forms">
+  <Display>DocumentLibraryForm</Display>
+  <Edit>DocumentLibraryForm</Edit>
+  <New>DocumentLibraryForm</New>
+</FormTemplates>
+</file>
+
 <file path=customXml/itemProps1.xml><?xml version="1.0" encoding="utf-8"?>
 <ds:datastoreItem xmlns:ds="http://schemas.openxmlformats.org/officeDocument/2006/customXml" ds:itemID="{88B0BFC8-0A8B-4BBB-ABD5-CF41F955155D}">
   <ds:schemaRefs>
@@ -6836,14 +7316,6 @@
 </file>
 
 <file path=customXml/itemProps2.xml><?xml version="1.0" encoding="utf-8"?>
-<ds:datastoreItem xmlns:ds="http://schemas.openxmlformats.org/officeDocument/2006/customXml" ds:itemID="{A9845EAA-D5AC-4DCF-8343-9F287406F94C}">
-  <ds:schemaRefs>
-    <ds:schemaRef ds:uri="http://schemas.microsoft.com/sharepoint/v3/contenttype/forms"/>
-  </ds:schemaRefs>
-</ds:datastoreItem>
-</file>
-
-<file path=customXml/itemProps3.xml><?xml version="1.0" encoding="utf-8"?>
 <ds:datastoreItem xmlns:ds="http://schemas.openxmlformats.org/officeDocument/2006/customXml" ds:itemID="{2508D1AE-73B5-430E-B68E-A4A85808E0BF}">
   <ds:schemaRefs>
     <ds:schemaRef ds:uri="http://schemas.microsoft.com/office/2006/metadata/contentType"/>
@@ -6860,4 +7332,12 @@
     <ds:schemaRef ds:uri="http://schemas.microsoft.com/internal/obd"/>
   </ds:schemaRefs>
 </ds:datastoreItem>
+</file>
+
+<file path=customXml/itemProps3.xml><?xml version="1.0" encoding="utf-8"?>
+<ds:datastoreItem xmlns:ds="http://schemas.openxmlformats.org/officeDocument/2006/customXml" ds:itemID="{A9845EAA-D5AC-4DCF-8343-9F287406F94C}">
+  <ds:schemaRefs>
+    <ds:schemaRef ds:uri="http://schemas.microsoft.com/sharepoint/v3/contenttype/forms"/>
+  </ds:schemaRefs>
+</ds:datastoreItem>
 </file>
</xml_diff>